<commit_message>
Added Use case qns
</commit_message>
<xml_diff>
--- a/Partitioning & SparkContext.pptx
+++ b/Partitioning & SparkContext.pptx
@@ -8,6 +8,7 @@
     <p:sldId id="256" r:id="rId2"/>
     <p:sldId id="257" r:id="rId3"/>
     <p:sldId id="258" r:id="rId4"/>
+    <p:sldId id="259" r:id="rId5"/>
   </p:sldIdLst>
   <p:sldSz cx="12192000" cy="6858000"/>
   <p:notesSz cx="6858000" cy="9144000"/>
@@ -261,7 +262,7 @@
           <a:p>
             <a:fld id="{47E0D79E-6804-0B41-9659-BE215799C31E}" type="datetimeFigureOut">
               <a:rPr lang="en-US" smtClean="0"/>
-              <a:t>4/11/20</a:t>
+              <a:t>4/17/20</a:t>
             </a:fld>
             <a:endParaRPr lang="en-US"/>
           </a:p>
@@ -459,7 +460,7 @@
           <a:p>
             <a:fld id="{47E0D79E-6804-0B41-9659-BE215799C31E}" type="datetimeFigureOut">
               <a:rPr lang="en-US" smtClean="0"/>
-              <a:t>4/11/20</a:t>
+              <a:t>4/17/20</a:t>
             </a:fld>
             <a:endParaRPr lang="en-US"/>
           </a:p>
@@ -667,7 +668,7 @@
           <a:p>
             <a:fld id="{47E0D79E-6804-0B41-9659-BE215799C31E}" type="datetimeFigureOut">
               <a:rPr lang="en-US" smtClean="0"/>
-              <a:t>4/11/20</a:t>
+              <a:t>4/17/20</a:t>
             </a:fld>
             <a:endParaRPr lang="en-US"/>
           </a:p>
@@ -865,7 +866,7 @@
           <a:p>
             <a:fld id="{47E0D79E-6804-0B41-9659-BE215799C31E}" type="datetimeFigureOut">
               <a:rPr lang="en-US" smtClean="0"/>
-              <a:t>4/11/20</a:t>
+              <a:t>4/17/20</a:t>
             </a:fld>
             <a:endParaRPr lang="en-US"/>
           </a:p>
@@ -1140,7 +1141,7 @@
           <a:p>
             <a:fld id="{47E0D79E-6804-0B41-9659-BE215799C31E}" type="datetimeFigureOut">
               <a:rPr lang="en-US" smtClean="0"/>
-              <a:t>4/11/20</a:t>
+              <a:t>4/17/20</a:t>
             </a:fld>
             <a:endParaRPr lang="en-US"/>
           </a:p>
@@ -1405,7 +1406,7 @@
           <a:p>
             <a:fld id="{47E0D79E-6804-0B41-9659-BE215799C31E}" type="datetimeFigureOut">
               <a:rPr lang="en-US" smtClean="0"/>
-              <a:t>4/11/20</a:t>
+              <a:t>4/17/20</a:t>
             </a:fld>
             <a:endParaRPr lang="en-US"/>
           </a:p>
@@ -1817,7 +1818,7 @@
           <a:p>
             <a:fld id="{47E0D79E-6804-0B41-9659-BE215799C31E}" type="datetimeFigureOut">
               <a:rPr lang="en-US" smtClean="0"/>
-              <a:t>4/11/20</a:t>
+              <a:t>4/17/20</a:t>
             </a:fld>
             <a:endParaRPr lang="en-US"/>
           </a:p>
@@ -1958,7 +1959,7 @@
           <a:p>
             <a:fld id="{47E0D79E-6804-0B41-9659-BE215799C31E}" type="datetimeFigureOut">
               <a:rPr lang="en-US" smtClean="0"/>
-              <a:t>4/11/20</a:t>
+              <a:t>4/17/20</a:t>
             </a:fld>
             <a:endParaRPr lang="en-US"/>
           </a:p>
@@ -2071,7 +2072,7 @@
           <a:p>
             <a:fld id="{47E0D79E-6804-0B41-9659-BE215799C31E}" type="datetimeFigureOut">
               <a:rPr lang="en-US" smtClean="0"/>
-              <a:t>4/11/20</a:t>
+              <a:t>4/17/20</a:t>
             </a:fld>
             <a:endParaRPr lang="en-US"/>
           </a:p>
@@ -2382,7 +2383,7 @@
           <a:p>
             <a:fld id="{47E0D79E-6804-0B41-9659-BE215799C31E}" type="datetimeFigureOut">
               <a:rPr lang="en-US" smtClean="0"/>
-              <a:t>4/11/20</a:t>
+              <a:t>4/17/20</a:t>
             </a:fld>
             <a:endParaRPr lang="en-US"/>
           </a:p>
@@ -2670,7 +2671,7 @@
           <a:p>
             <a:fld id="{47E0D79E-6804-0B41-9659-BE215799C31E}" type="datetimeFigureOut">
               <a:rPr lang="en-US" smtClean="0"/>
-              <a:t>4/11/20</a:t>
+              <a:t>4/17/20</a:t>
             </a:fld>
             <a:endParaRPr lang="en-US"/>
           </a:p>
@@ -2911,7 +2912,7 @@
           <a:p>
             <a:fld id="{47E0D79E-6804-0B41-9659-BE215799C31E}" type="datetimeFigureOut">
               <a:rPr lang="en-US" smtClean="0"/>
-              <a:t>4/11/20</a:t>
+              <a:t>4/17/20</a:t>
             </a:fld>
             <a:endParaRPr lang="en-US"/>
           </a:p>
@@ -7868,6 +7869,1141 @@
 </p:sld>
 </file>
 
+<file path=ppt/slides/slide4.xml><?xml version="1.0" encoding="utf-8"?>
+<p:sld xmlns:a="http://schemas.openxmlformats.org/drawingml/2006/main" xmlns:r="http://schemas.openxmlformats.org/officeDocument/2006/relationships" xmlns:p="http://schemas.openxmlformats.org/presentationml/2006/main">
+  <p:cSld>
+    <p:spTree>
+      <p:nvGrpSpPr>
+        <p:cNvPr id="1" name=""/>
+        <p:cNvGrpSpPr/>
+        <p:nvPr/>
+      </p:nvGrpSpPr>
+      <p:grpSpPr>
+        <a:xfrm>
+          <a:off x="0" y="0"/>
+          <a:ext cx="0" cy="0"/>
+          <a:chOff x="0" y="0"/>
+          <a:chExt cx="0" cy="0"/>
+        </a:xfrm>
+      </p:grpSpPr>
+      <p:sp>
+        <p:nvSpPr>
+          <p:cNvPr id="2" name="Title 1">
+            <a:extLst>
+              <a:ext uri="{FF2B5EF4-FFF2-40B4-BE49-F238E27FC236}">
+                <a16:creationId xmlns:a16="http://schemas.microsoft.com/office/drawing/2014/main" id="{6221D110-9F03-EF47-AC5C-1EAB8071190E}"/>
+              </a:ext>
+            </a:extLst>
+          </p:cNvPr>
+          <p:cNvSpPr>
+            <a:spLocks noGrp="1"/>
+          </p:cNvSpPr>
+          <p:nvPr>
+            <p:ph type="title"/>
+          </p:nvPr>
+        </p:nvSpPr>
+        <p:spPr>
+          <a:xfrm>
+            <a:off x="423530" y="195005"/>
+            <a:ext cx="10515600" cy="868252"/>
+          </a:xfrm>
+        </p:spPr>
+        <p:txBody>
+          <a:bodyPr/>
+          <a:lstStyle/>
+          <a:p>
+            <a:r>
+              <a:rPr lang="en-US" dirty="0">
+                <a:latin typeface="Avenir Roman" panose="02000503020000020003" pitchFamily="2" charset="0"/>
+              </a:rPr>
+              <a:t>Execution Plan – Catalyst Optimizer</a:t>
+            </a:r>
+          </a:p>
+        </p:txBody>
+      </p:sp>
+      <p:sp>
+        <p:nvSpPr>
+          <p:cNvPr id="4" name="Rectangle 3">
+            <a:extLst>
+              <a:ext uri="{FF2B5EF4-FFF2-40B4-BE49-F238E27FC236}">
+                <a16:creationId xmlns:a16="http://schemas.microsoft.com/office/drawing/2014/main" id="{AB8D6067-BF88-8C49-9701-B4C7175E7524}"/>
+              </a:ext>
+            </a:extLst>
+          </p:cNvPr>
+          <p:cNvSpPr/>
+          <p:nvPr/>
+        </p:nvSpPr>
+        <p:spPr>
+          <a:xfrm>
+            <a:off x="127592" y="1607285"/>
+            <a:ext cx="1286538" cy="382773"/>
+          </a:xfrm>
+          <a:prstGeom prst="rect">
+            <a:avLst/>
+          </a:prstGeom>
+          <a:solidFill>
+            <a:srgbClr val="0096FF"/>
+          </a:solidFill>
+          <a:ln>
+            <a:noFill/>
+          </a:ln>
+        </p:spPr>
+        <p:style>
+          <a:lnRef idx="2">
+            <a:schemeClr val="accent1">
+              <a:shade val="50000"/>
+            </a:schemeClr>
+          </a:lnRef>
+          <a:fillRef idx="1">
+            <a:schemeClr val="accent1"/>
+          </a:fillRef>
+          <a:effectRef idx="0">
+            <a:schemeClr val="accent1"/>
+          </a:effectRef>
+          <a:fontRef idx="minor">
+            <a:schemeClr val="lt1"/>
+          </a:fontRef>
+        </p:style>
+        <p:txBody>
+          <a:bodyPr rtlCol="0" anchor="ctr"/>
+          <a:lstStyle/>
+          <a:p>
+            <a:pPr algn="ctr"/>
+            <a:r>
+              <a:rPr lang="en-US" sz="1600" dirty="0">
+                <a:latin typeface="Avenir Roman" panose="02000503020000020003" pitchFamily="2" charset="0"/>
+              </a:rPr>
+              <a:t>Spark SQL</a:t>
+            </a:r>
+          </a:p>
+        </p:txBody>
+      </p:sp>
+      <p:sp>
+        <p:nvSpPr>
+          <p:cNvPr id="5" name="Rectangle 4">
+            <a:extLst>
+              <a:ext uri="{FF2B5EF4-FFF2-40B4-BE49-F238E27FC236}">
+                <a16:creationId xmlns:a16="http://schemas.microsoft.com/office/drawing/2014/main" id="{5B475EDC-CD43-424D-9478-133BF5BA0111}"/>
+              </a:ext>
+            </a:extLst>
+          </p:cNvPr>
+          <p:cNvSpPr/>
+          <p:nvPr/>
+        </p:nvSpPr>
+        <p:spPr>
+          <a:xfrm>
+            <a:off x="127591" y="3012555"/>
+            <a:ext cx="1286537" cy="382773"/>
+          </a:xfrm>
+          <a:prstGeom prst="rect">
+            <a:avLst/>
+          </a:prstGeom>
+          <a:solidFill>
+            <a:srgbClr val="0096FF"/>
+          </a:solidFill>
+          <a:ln>
+            <a:noFill/>
+          </a:ln>
+        </p:spPr>
+        <p:style>
+          <a:lnRef idx="2">
+            <a:schemeClr val="accent1">
+              <a:shade val="50000"/>
+            </a:schemeClr>
+          </a:lnRef>
+          <a:fillRef idx="1">
+            <a:schemeClr val="accent1"/>
+          </a:fillRef>
+          <a:effectRef idx="0">
+            <a:schemeClr val="accent1"/>
+          </a:effectRef>
+          <a:fontRef idx="minor">
+            <a:schemeClr val="lt1"/>
+          </a:fontRef>
+        </p:style>
+        <p:txBody>
+          <a:bodyPr rtlCol="0" anchor="ctr"/>
+          <a:lstStyle/>
+          <a:p>
+            <a:pPr algn="ctr"/>
+            <a:r>
+              <a:rPr lang="en-US" sz="1600" dirty="0" err="1">
+                <a:latin typeface="Avenir Roman" panose="02000503020000020003" pitchFamily="2" charset="0"/>
+              </a:rPr>
+              <a:t>DataFrame</a:t>
+            </a:r>
+            <a:endParaRPr lang="en-US" sz="1600" dirty="0">
+              <a:latin typeface="Avenir Roman" panose="02000503020000020003" pitchFamily="2" charset="0"/>
+            </a:endParaRPr>
+          </a:p>
+        </p:txBody>
+      </p:sp>
+      <p:sp>
+        <p:nvSpPr>
+          <p:cNvPr id="6" name="Rectangle 5">
+            <a:extLst>
+              <a:ext uri="{FF2B5EF4-FFF2-40B4-BE49-F238E27FC236}">
+                <a16:creationId xmlns:a16="http://schemas.microsoft.com/office/drawing/2014/main" id="{20EBEB6F-4BCD-4944-80BA-E32BD186F098}"/>
+              </a:ext>
+            </a:extLst>
+          </p:cNvPr>
+          <p:cNvSpPr/>
+          <p:nvPr/>
+        </p:nvSpPr>
+        <p:spPr>
+          <a:xfrm>
+            <a:off x="1811080" y="2030817"/>
+            <a:ext cx="1158949" cy="779720"/>
+          </a:xfrm>
+          <a:prstGeom prst="rect">
+            <a:avLst/>
+          </a:prstGeom>
+          <a:solidFill>
+            <a:srgbClr val="FF9300"/>
+          </a:solidFill>
+          <a:ln>
+            <a:noFill/>
+          </a:ln>
+        </p:spPr>
+        <p:style>
+          <a:lnRef idx="2">
+            <a:schemeClr val="accent1">
+              <a:shade val="50000"/>
+            </a:schemeClr>
+          </a:lnRef>
+          <a:fillRef idx="1">
+            <a:schemeClr val="accent1"/>
+          </a:fillRef>
+          <a:effectRef idx="0">
+            <a:schemeClr val="accent1"/>
+          </a:effectRef>
+          <a:fontRef idx="minor">
+            <a:schemeClr val="lt1"/>
+          </a:fontRef>
+        </p:style>
+        <p:txBody>
+          <a:bodyPr rtlCol="0" anchor="ctr"/>
+          <a:lstStyle/>
+          <a:p>
+            <a:pPr algn="ctr"/>
+            <a:r>
+              <a:rPr lang="en-US" sz="1400" dirty="0">
+                <a:latin typeface="Avenir Roman" panose="02000503020000020003" pitchFamily="2" charset="0"/>
+              </a:rPr>
+              <a:t>Unresolved Logical Plan</a:t>
+            </a:r>
+          </a:p>
+        </p:txBody>
+      </p:sp>
+      <p:sp>
+        <p:nvSpPr>
+          <p:cNvPr id="7" name="Rectangle 6">
+            <a:extLst>
+              <a:ext uri="{FF2B5EF4-FFF2-40B4-BE49-F238E27FC236}">
+                <a16:creationId xmlns:a16="http://schemas.microsoft.com/office/drawing/2014/main" id="{37E00159-98E2-3549-899D-73B880A4D759}"/>
+              </a:ext>
+            </a:extLst>
+          </p:cNvPr>
+          <p:cNvSpPr/>
+          <p:nvPr/>
+        </p:nvSpPr>
+        <p:spPr>
+          <a:xfrm>
+            <a:off x="3379381" y="2030817"/>
+            <a:ext cx="1158949" cy="779720"/>
+          </a:xfrm>
+          <a:prstGeom prst="rect">
+            <a:avLst/>
+          </a:prstGeom>
+          <a:solidFill>
+            <a:srgbClr val="FF9300"/>
+          </a:solidFill>
+          <a:ln>
+            <a:noFill/>
+          </a:ln>
+        </p:spPr>
+        <p:style>
+          <a:lnRef idx="2">
+            <a:schemeClr val="accent1">
+              <a:shade val="50000"/>
+            </a:schemeClr>
+          </a:lnRef>
+          <a:fillRef idx="1">
+            <a:schemeClr val="accent1"/>
+          </a:fillRef>
+          <a:effectRef idx="0">
+            <a:schemeClr val="accent1"/>
+          </a:effectRef>
+          <a:fontRef idx="minor">
+            <a:schemeClr val="lt1"/>
+          </a:fontRef>
+        </p:style>
+        <p:txBody>
+          <a:bodyPr rtlCol="0" anchor="ctr"/>
+          <a:lstStyle/>
+          <a:p>
+            <a:pPr algn="ctr"/>
+            <a:r>
+              <a:rPr lang="en-US" sz="1400" dirty="0">
+                <a:latin typeface="Avenir Roman" panose="02000503020000020003" pitchFamily="2" charset="0"/>
+              </a:rPr>
+              <a:t>Resolved Logical Plan</a:t>
+            </a:r>
+          </a:p>
+        </p:txBody>
+      </p:sp>
+      <p:sp>
+        <p:nvSpPr>
+          <p:cNvPr id="8" name="Rectangle 7">
+            <a:extLst>
+              <a:ext uri="{FF2B5EF4-FFF2-40B4-BE49-F238E27FC236}">
+                <a16:creationId xmlns:a16="http://schemas.microsoft.com/office/drawing/2014/main" id="{0AB64878-87D5-F647-A5C8-D424DF7DB022}"/>
+              </a:ext>
+            </a:extLst>
+          </p:cNvPr>
+          <p:cNvSpPr/>
+          <p:nvPr/>
+        </p:nvSpPr>
+        <p:spPr>
+          <a:xfrm>
+            <a:off x="4976039" y="2030817"/>
+            <a:ext cx="1158949" cy="779720"/>
+          </a:xfrm>
+          <a:prstGeom prst="rect">
+            <a:avLst/>
+          </a:prstGeom>
+          <a:solidFill>
+            <a:srgbClr val="FF9300"/>
+          </a:solidFill>
+          <a:ln>
+            <a:noFill/>
+          </a:ln>
+        </p:spPr>
+        <p:style>
+          <a:lnRef idx="2">
+            <a:schemeClr val="accent1">
+              <a:shade val="50000"/>
+            </a:schemeClr>
+          </a:lnRef>
+          <a:fillRef idx="1">
+            <a:schemeClr val="accent1"/>
+          </a:fillRef>
+          <a:effectRef idx="0">
+            <a:schemeClr val="accent1"/>
+          </a:effectRef>
+          <a:fontRef idx="minor">
+            <a:schemeClr val="lt1"/>
+          </a:fontRef>
+        </p:style>
+        <p:txBody>
+          <a:bodyPr rtlCol="0" anchor="ctr"/>
+          <a:lstStyle/>
+          <a:p>
+            <a:pPr algn="ctr"/>
+            <a:r>
+              <a:rPr lang="en-US" sz="1400" dirty="0">
+                <a:latin typeface="Avenir Roman" panose="02000503020000020003" pitchFamily="2" charset="0"/>
+              </a:rPr>
+              <a:t>Optimized Logical Plan</a:t>
+            </a:r>
+          </a:p>
+        </p:txBody>
+      </p:sp>
+      <p:sp>
+        <p:nvSpPr>
+          <p:cNvPr id="9" name="Rectangle 8">
+            <a:extLst>
+              <a:ext uri="{FF2B5EF4-FFF2-40B4-BE49-F238E27FC236}">
+                <a16:creationId xmlns:a16="http://schemas.microsoft.com/office/drawing/2014/main" id="{F70FB0E5-FEE2-324F-9144-31A069A03D3C}"/>
+              </a:ext>
+            </a:extLst>
+          </p:cNvPr>
+          <p:cNvSpPr/>
+          <p:nvPr/>
+        </p:nvSpPr>
+        <p:spPr>
+          <a:xfrm>
+            <a:off x="6592184" y="2030817"/>
+            <a:ext cx="988826" cy="779720"/>
+          </a:xfrm>
+          <a:prstGeom prst="rect">
+            <a:avLst/>
+          </a:prstGeom>
+          <a:solidFill>
+            <a:srgbClr val="00B050"/>
+          </a:solidFill>
+          <a:ln>
+            <a:noFill/>
+          </a:ln>
+        </p:spPr>
+        <p:style>
+          <a:lnRef idx="2">
+            <a:schemeClr val="accent1">
+              <a:shade val="50000"/>
+            </a:schemeClr>
+          </a:lnRef>
+          <a:fillRef idx="1">
+            <a:schemeClr val="accent1"/>
+          </a:fillRef>
+          <a:effectRef idx="0">
+            <a:schemeClr val="accent1"/>
+          </a:effectRef>
+          <a:fontRef idx="minor">
+            <a:schemeClr val="lt1"/>
+          </a:fontRef>
+        </p:style>
+        <p:txBody>
+          <a:bodyPr rtlCol="0" anchor="ctr"/>
+          <a:lstStyle/>
+          <a:p>
+            <a:pPr algn="ctr"/>
+            <a:r>
+              <a:rPr lang="en-US" sz="1600" dirty="0">
+                <a:latin typeface="Avenir Roman" panose="02000503020000020003" pitchFamily="2" charset="0"/>
+              </a:rPr>
+              <a:t>Physical Plan</a:t>
+            </a:r>
+          </a:p>
+        </p:txBody>
+      </p:sp>
+      <p:cxnSp>
+        <p:nvCxnSpPr>
+          <p:cNvPr id="13" name="Elbow Connector 12">
+            <a:extLst>
+              <a:ext uri="{FF2B5EF4-FFF2-40B4-BE49-F238E27FC236}">
+                <a16:creationId xmlns:a16="http://schemas.microsoft.com/office/drawing/2014/main" id="{13BAED3B-61FE-2E42-AF08-6B5F19CE5FC3}"/>
+              </a:ext>
+            </a:extLst>
+          </p:cNvPr>
+          <p:cNvCxnSpPr>
+            <a:cxnSpLocks/>
+            <a:stCxn id="4" idx="3"/>
+            <a:endCxn id="6" idx="0"/>
+          </p:cNvCxnSpPr>
+          <p:nvPr/>
+        </p:nvCxnSpPr>
+        <p:spPr>
+          <a:xfrm>
+            <a:off x="1414130" y="1798672"/>
+            <a:ext cx="976425" cy="232145"/>
+          </a:xfrm>
+          <a:prstGeom prst="bentConnector2">
+            <a:avLst/>
+          </a:prstGeom>
+          <a:ln w="19050">
+            <a:solidFill>
+              <a:schemeClr val="tx1">
+                <a:lumMod val="50000"/>
+                <a:lumOff val="50000"/>
+              </a:schemeClr>
+            </a:solidFill>
+            <a:prstDash val="dash"/>
+            <a:tailEnd type="triangle"/>
+          </a:ln>
+        </p:spPr>
+        <p:style>
+          <a:lnRef idx="1">
+            <a:schemeClr val="accent1"/>
+          </a:lnRef>
+          <a:fillRef idx="0">
+            <a:schemeClr val="accent1"/>
+          </a:fillRef>
+          <a:effectRef idx="0">
+            <a:schemeClr val="accent1"/>
+          </a:effectRef>
+          <a:fontRef idx="minor">
+            <a:schemeClr val="tx1"/>
+          </a:fontRef>
+        </p:style>
+      </p:cxnSp>
+      <p:cxnSp>
+        <p:nvCxnSpPr>
+          <p:cNvPr id="14" name="Elbow Connector 13">
+            <a:extLst>
+              <a:ext uri="{FF2B5EF4-FFF2-40B4-BE49-F238E27FC236}">
+                <a16:creationId xmlns:a16="http://schemas.microsoft.com/office/drawing/2014/main" id="{2225352A-92E3-BA4F-A680-06974E15C74C}"/>
+              </a:ext>
+            </a:extLst>
+          </p:cNvPr>
+          <p:cNvCxnSpPr>
+            <a:cxnSpLocks/>
+            <a:endCxn id="6" idx="2"/>
+          </p:cNvCxnSpPr>
+          <p:nvPr/>
+        </p:nvCxnSpPr>
+        <p:spPr>
+          <a:xfrm flipV="1">
+            <a:off x="1414129" y="2810537"/>
+            <a:ext cx="976426" cy="393404"/>
+          </a:xfrm>
+          <a:prstGeom prst="bentConnector2">
+            <a:avLst/>
+          </a:prstGeom>
+          <a:ln w="19050">
+            <a:solidFill>
+              <a:schemeClr val="tx1">
+                <a:lumMod val="85000"/>
+                <a:lumOff val="15000"/>
+              </a:schemeClr>
+            </a:solidFill>
+            <a:tailEnd type="triangle"/>
+          </a:ln>
+        </p:spPr>
+        <p:style>
+          <a:lnRef idx="1">
+            <a:schemeClr val="accent1"/>
+          </a:lnRef>
+          <a:fillRef idx="0">
+            <a:schemeClr val="accent1"/>
+          </a:fillRef>
+          <a:effectRef idx="0">
+            <a:schemeClr val="accent1"/>
+          </a:effectRef>
+          <a:fontRef idx="minor">
+            <a:schemeClr val="tx1"/>
+          </a:fontRef>
+        </p:style>
+      </p:cxnSp>
+      <p:cxnSp>
+        <p:nvCxnSpPr>
+          <p:cNvPr id="17" name="Straight Arrow Connector 16">
+            <a:extLst>
+              <a:ext uri="{FF2B5EF4-FFF2-40B4-BE49-F238E27FC236}">
+                <a16:creationId xmlns:a16="http://schemas.microsoft.com/office/drawing/2014/main" id="{0EC1AAE6-455D-A247-83C3-AFDE81EE9183}"/>
+              </a:ext>
+            </a:extLst>
+          </p:cNvPr>
+          <p:cNvCxnSpPr>
+            <a:stCxn id="6" idx="3"/>
+            <a:endCxn id="7" idx="1"/>
+          </p:cNvCxnSpPr>
+          <p:nvPr/>
+        </p:nvCxnSpPr>
+        <p:spPr>
+          <a:xfrm>
+            <a:off x="2970029" y="2420677"/>
+            <a:ext cx="409352" cy="0"/>
+          </a:xfrm>
+          <a:prstGeom prst="straightConnector1">
+            <a:avLst/>
+          </a:prstGeom>
+          <a:ln w="19050">
+            <a:solidFill>
+              <a:schemeClr val="tx1">
+                <a:lumMod val="85000"/>
+                <a:lumOff val="15000"/>
+              </a:schemeClr>
+            </a:solidFill>
+            <a:tailEnd type="triangle"/>
+          </a:ln>
+        </p:spPr>
+        <p:style>
+          <a:lnRef idx="1">
+            <a:schemeClr val="accent1"/>
+          </a:lnRef>
+          <a:fillRef idx="0">
+            <a:schemeClr val="accent1"/>
+          </a:fillRef>
+          <a:effectRef idx="0">
+            <a:schemeClr val="accent1"/>
+          </a:effectRef>
+          <a:fontRef idx="minor">
+            <a:schemeClr val="tx1"/>
+          </a:fontRef>
+        </p:style>
+      </p:cxnSp>
+      <p:cxnSp>
+        <p:nvCxnSpPr>
+          <p:cNvPr id="18" name="Straight Arrow Connector 17">
+            <a:extLst>
+              <a:ext uri="{FF2B5EF4-FFF2-40B4-BE49-F238E27FC236}">
+                <a16:creationId xmlns:a16="http://schemas.microsoft.com/office/drawing/2014/main" id="{070081C8-2C84-6548-BA8C-4138923B983C}"/>
+              </a:ext>
+            </a:extLst>
+          </p:cNvPr>
+          <p:cNvCxnSpPr>
+            <a:cxnSpLocks/>
+            <a:stCxn id="7" idx="3"/>
+            <a:endCxn id="8" idx="1"/>
+          </p:cNvCxnSpPr>
+          <p:nvPr/>
+        </p:nvCxnSpPr>
+        <p:spPr>
+          <a:xfrm>
+            <a:off x="4538330" y="2420677"/>
+            <a:ext cx="437709" cy="0"/>
+          </a:xfrm>
+          <a:prstGeom prst="straightConnector1">
+            <a:avLst/>
+          </a:prstGeom>
+          <a:ln w="19050">
+            <a:solidFill>
+              <a:schemeClr val="tx1">
+                <a:lumMod val="85000"/>
+                <a:lumOff val="15000"/>
+              </a:schemeClr>
+            </a:solidFill>
+            <a:tailEnd type="triangle"/>
+          </a:ln>
+        </p:spPr>
+        <p:style>
+          <a:lnRef idx="1">
+            <a:schemeClr val="accent1"/>
+          </a:lnRef>
+          <a:fillRef idx="0">
+            <a:schemeClr val="accent1"/>
+          </a:fillRef>
+          <a:effectRef idx="0">
+            <a:schemeClr val="accent1"/>
+          </a:effectRef>
+          <a:fontRef idx="minor">
+            <a:schemeClr val="tx1"/>
+          </a:fontRef>
+        </p:style>
+      </p:cxnSp>
+      <p:cxnSp>
+        <p:nvCxnSpPr>
+          <p:cNvPr id="19" name="Straight Arrow Connector 18">
+            <a:extLst>
+              <a:ext uri="{FF2B5EF4-FFF2-40B4-BE49-F238E27FC236}">
+                <a16:creationId xmlns:a16="http://schemas.microsoft.com/office/drawing/2014/main" id="{9404F2AE-8A4C-DD42-BD96-347F187B60A5}"/>
+              </a:ext>
+            </a:extLst>
+          </p:cNvPr>
+          <p:cNvCxnSpPr>
+            <a:cxnSpLocks/>
+            <a:stCxn id="8" idx="3"/>
+            <a:endCxn id="9" idx="1"/>
+          </p:cNvCxnSpPr>
+          <p:nvPr/>
+        </p:nvCxnSpPr>
+        <p:spPr>
+          <a:xfrm>
+            <a:off x="6134988" y="2420677"/>
+            <a:ext cx="457196" cy="0"/>
+          </a:xfrm>
+          <a:prstGeom prst="straightConnector1">
+            <a:avLst/>
+          </a:prstGeom>
+          <a:ln w="19050">
+            <a:solidFill>
+              <a:schemeClr val="tx1">
+                <a:lumMod val="85000"/>
+                <a:lumOff val="15000"/>
+              </a:schemeClr>
+            </a:solidFill>
+            <a:tailEnd type="triangle"/>
+          </a:ln>
+        </p:spPr>
+        <p:style>
+          <a:lnRef idx="1">
+            <a:schemeClr val="accent1"/>
+          </a:lnRef>
+          <a:fillRef idx="0">
+            <a:schemeClr val="accent1"/>
+          </a:fillRef>
+          <a:effectRef idx="0">
+            <a:schemeClr val="accent1"/>
+          </a:effectRef>
+          <a:fontRef idx="minor">
+            <a:schemeClr val="tx1"/>
+          </a:fontRef>
+        </p:style>
+      </p:cxnSp>
+      <p:sp>
+        <p:nvSpPr>
+          <p:cNvPr id="20" name="Rectangle 19">
+            <a:extLst>
+              <a:ext uri="{FF2B5EF4-FFF2-40B4-BE49-F238E27FC236}">
+                <a16:creationId xmlns:a16="http://schemas.microsoft.com/office/drawing/2014/main" id="{BDE7853D-C315-D445-9B53-14E90CD82F91}"/>
+              </a:ext>
+            </a:extLst>
+          </p:cNvPr>
+          <p:cNvSpPr/>
+          <p:nvPr/>
+        </p:nvSpPr>
+        <p:spPr>
+          <a:xfrm>
+            <a:off x="8038206" y="2030817"/>
+            <a:ext cx="903767" cy="779720"/>
+          </a:xfrm>
+          <a:prstGeom prst="rect">
+            <a:avLst/>
+          </a:prstGeom>
+          <a:ln>
+            <a:noFill/>
+          </a:ln>
+        </p:spPr>
+        <p:style>
+          <a:lnRef idx="2">
+            <a:schemeClr val="accent1">
+              <a:shade val="50000"/>
+            </a:schemeClr>
+          </a:lnRef>
+          <a:fillRef idx="1">
+            <a:schemeClr val="accent1"/>
+          </a:fillRef>
+          <a:effectRef idx="0">
+            <a:schemeClr val="accent1"/>
+          </a:effectRef>
+          <a:fontRef idx="minor">
+            <a:schemeClr val="lt1"/>
+          </a:fontRef>
+        </p:style>
+        <p:txBody>
+          <a:bodyPr rtlCol="0" anchor="ctr"/>
+          <a:lstStyle/>
+          <a:p>
+            <a:pPr algn="ctr"/>
+            <a:r>
+              <a:rPr lang="en-US" sz="1600" dirty="0">
+                <a:latin typeface="Avenir Roman" panose="02000503020000020003" pitchFamily="2" charset="0"/>
+              </a:rPr>
+              <a:t>Cost Model</a:t>
+            </a:r>
+          </a:p>
+        </p:txBody>
+      </p:sp>
+      <p:cxnSp>
+        <p:nvCxnSpPr>
+          <p:cNvPr id="21" name="Straight Arrow Connector 20">
+            <a:extLst>
+              <a:ext uri="{FF2B5EF4-FFF2-40B4-BE49-F238E27FC236}">
+                <a16:creationId xmlns:a16="http://schemas.microsoft.com/office/drawing/2014/main" id="{BF73F6D6-28A0-E349-B9E6-BFA1E487A28C}"/>
+              </a:ext>
+            </a:extLst>
+          </p:cNvPr>
+          <p:cNvCxnSpPr>
+            <a:cxnSpLocks/>
+            <a:stCxn id="9" idx="3"/>
+            <a:endCxn id="20" idx="1"/>
+          </p:cNvCxnSpPr>
+          <p:nvPr/>
+        </p:nvCxnSpPr>
+        <p:spPr>
+          <a:xfrm>
+            <a:off x="7581010" y="2420677"/>
+            <a:ext cx="457196" cy="0"/>
+          </a:xfrm>
+          <a:prstGeom prst="straightConnector1">
+            <a:avLst/>
+          </a:prstGeom>
+          <a:ln w="19050">
+            <a:solidFill>
+              <a:schemeClr val="tx1">
+                <a:lumMod val="85000"/>
+                <a:lumOff val="15000"/>
+              </a:schemeClr>
+            </a:solidFill>
+            <a:tailEnd type="triangle"/>
+          </a:ln>
+        </p:spPr>
+        <p:style>
+          <a:lnRef idx="1">
+            <a:schemeClr val="accent1"/>
+          </a:lnRef>
+          <a:fillRef idx="0">
+            <a:schemeClr val="accent1"/>
+          </a:fillRef>
+          <a:effectRef idx="0">
+            <a:schemeClr val="accent1"/>
+          </a:effectRef>
+          <a:fontRef idx="minor">
+            <a:schemeClr val="tx1"/>
+          </a:fontRef>
+        </p:style>
+      </p:cxnSp>
+      <p:sp>
+        <p:nvSpPr>
+          <p:cNvPr id="22" name="Rectangle 21">
+            <a:extLst>
+              <a:ext uri="{FF2B5EF4-FFF2-40B4-BE49-F238E27FC236}">
+                <a16:creationId xmlns:a16="http://schemas.microsoft.com/office/drawing/2014/main" id="{D105D851-6DD1-5C46-BC83-2D706EAF557B}"/>
+              </a:ext>
+            </a:extLst>
+          </p:cNvPr>
+          <p:cNvSpPr/>
+          <p:nvPr/>
+        </p:nvSpPr>
+        <p:spPr>
+          <a:xfrm>
+            <a:off x="9471825" y="2030817"/>
+            <a:ext cx="981739" cy="779720"/>
+          </a:xfrm>
+          <a:prstGeom prst="rect">
+            <a:avLst/>
+          </a:prstGeom>
+          <a:solidFill>
+            <a:srgbClr val="00B050"/>
+          </a:solidFill>
+          <a:ln>
+            <a:noFill/>
+          </a:ln>
+        </p:spPr>
+        <p:style>
+          <a:lnRef idx="2">
+            <a:schemeClr val="accent1">
+              <a:shade val="50000"/>
+            </a:schemeClr>
+          </a:lnRef>
+          <a:fillRef idx="1">
+            <a:schemeClr val="accent1"/>
+          </a:fillRef>
+          <a:effectRef idx="0">
+            <a:schemeClr val="accent1"/>
+          </a:effectRef>
+          <a:fontRef idx="minor">
+            <a:schemeClr val="lt1"/>
+          </a:fontRef>
+        </p:style>
+        <p:txBody>
+          <a:bodyPr rtlCol="0" anchor="ctr"/>
+          <a:lstStyle/>
+          <a:p>
+            <a:pPr algn="ctr"/>
+            <a:r>
+              <a:rPr lang="en-US" sz="1600" dirty="0">
+                <a:latin typeface="Avenir Roman" panose="02000503020000020003" pitchFamily="2" charset="0"/>
+              </a:rPr>
+              <a:t>Final</a:t>
+            </a:r>
+          </a:p>
+          <a:p>
+            <a:pPr algn="ctr"/>
+            <a:r>
+              <a:rPr lang="en-US" sz="1600" dirty="0">
+                <a:latin typeface="Avenir Roman" panose="02000503020000020003" pitchFamily="2" charset="0"/>
+              </a:rPr>
+              <a:t>Physical Plan</a:t>
+            </a:r>
+          </a:p>
+        </p:txBody>
+      </p:sp>
+      <p:cxnSp>
+        <p:nvCxnSpPr>
+          <p:cNvPr id="23" name="Straight Arrow Connector 22">
+            <a:extLst>
+              <a:ext uri="{FF2B5EF4-FFF2-40B4-BE49-F238E27FC236}">
+                <a16:creationId xmlns:a16="http://schemas.microsoft.com/office/drawing/2014/main" id="{15D13473-F5B8-1D49-8C97-040B0647E170}"/>
+              </a:ext>
+            </a:extLst>
+          </p:cNvPr>
+          <p:cNvCxnSpPr>
+            <a:cxnSpLocks/>
+            <a:stCxn id="20" idx="3"/>
+            <a:endCxn id="22" idx="1"/>
+          </p:cNvCxnSpPr>
+          <p:nvPr/>
+        </p:nvCxnSpPr>
+        <p:spPr>
+          <a:xfrm>
+            <a:off x="8941973" y="2420677"/>
+            <a:ext cx="529852" cy="0"/>
+          </a:xfrm>
+          <a:prstGeom prst="straightConnector1">
+            <a:avLst/>
+          </a:prstGeom>
+          <a:ln w="19050">
+            <a:solidFill>
+              <a:schemeClr val="tx1">
+                <a:lumMod val="85000"/>
+                <a:lumOff val="15000"/>
+              </a:schemeClr>
+            </a:solidFill>
+            <a:tailEnd type="triangle"/>
+          </a:ln>
+        </p:spPr>
+        <p:style>
+          <a:lnRef idx="1">
+            <a:schemeClr val="accent1"/>
+          </a:lnRef>
+          <a:fillRef idx="0">
+            <a:schemeClr val="accent1"/>
+          </a:fillRef>
+          <a:effectRef idx="0">
+            <a:schemeClr val="accent1"/>
+          </a:effectRef>
+          <a:fontRef idx="minor">
+            <a:schemeClr val="tx1"/>
+          </a:fontRef>
+        </p:style>
+      </p:cxnSp>
+      <p:sp>
+        <p:nvSpPr>
+          <p:cNvPr id="36" name="Rectangle 35">
+            <a:extLst>
+              <a:ext uri="{FF2B5EF4-FFF2-40B4-BE49-F238E27FC236}">
+                <a16:creationId xmlns:a16="http://schemas.microsoft.com/office/drawing/2014/main" id="{9A760B17-C674-204A-BF6D-10A9AA18D000}"/>
+              </a:ext>
+            </a:extLst>
+          </p:cNvPr>
+          <p:cNvSpPr/>
+          <p:nvPr/>
+        </p:nvSpPr>
+        <p:spPr>
+          <a:xfrm>
+            <a:off x="10960396" y="2030817"/>
+            <a:ext cx="848846" cy="779720"/>
+          </a:xfrm>
+          <a:prstGeom prst="rect">
+            <a:avLst/>
+          </a:prstGeom>
+          <a:solidFill>
+            <a:srgbClr val="FF7E79"/>
+          </a:solidFill>
+          <a:ln>
+            <a:noFill/>
+          </a:ln>
+        </p:spPr>
+        <p:style>
+          <a:lnRef idx="2">
+            <a:schemeClr val="accent1">
+              <a:shade val="50000"/>
+            </a:schemeClr>
+          </a:lnRef>
+          <a:fillRef idx="1">
+            <a:schemeClr val="accent1"/>
+          </a:fillRef>
+          <a:effectRef idx="0">
+            <a:schemeClr val="accent1"/>
+          </a:effectRef>
+          <a:fontRef idx="minor">
+            <a:schemeClr val="lt1"/>
+          </a:fontRef>
+        </p:style>
+        <p:txBody>
+          <a:bodyPr rtlCol="0" anchor="ctr"/>
+          <a:lstStyle/>
+          <a:p>
+            <a:pPr algn="ctr"/>
+            <a:r>
+              <a:rPr lang="en-US" sz="1600" dirty="0">
+                <a:latin typeface="Avenir Roman" panose="02000503020000020003" pitchFamily="2" charset="0"/>
+              </a:rPr>
+              <a:t>RDDs</a:t>
+            </a:r>
+          </a:p>
+        </p:txBody>
+      </p:sp>
+      <p:cxnSp>
+        <p:nvCxnSpPr>
+          <p:cNvPr id="37" name="Straight Arrow Connector 36">
+            <a:extLst>
+              <a:ext uri="{FF2B5EF4-FFF2-40B4-BE49-F238E27FC236}">
+                <a16:creationId xmlns:a16="http://schemas.microsoft.com/office/drawing/2014/main" id="{145EF469-4BA9-374F-86EF-E959E38E7430}"/>
+              </a:ext>
+            </a:extLst>
+          </p:cNvPr>
+          <p:cNvCxnSpPr>
+            <a:cxnSpLocks/>
+            <a:stCxn id="22" idx="3"/>
+            <a:endCxn id="36" idx="1"/>
+          </p:cNvCxnSpPr>
+          <p:nvPr/>
+        </p:nvCxnSpPr>
+        <p:spPr>
+          <a:xfrm>
+            <a:off x="10453564" y="2420677"/>
+            <a:ext cx="506832" cy="0"/>
+          </a:xfrm>
+          <a:prstGeom prst="straightConnector1">
+            <a:avLst/>
+          </a:prstGeom>
+          <a:ln w="19050">
+            <a:solidFill>
+              <a:schemeClr val="tx1">
+                <a:lumMod val="85000"/>
+                <a:lumOff val="15000"/>
+              </a:schemeClr>
+            </a:solidFill>
+            <a:tailEnd type="triangle"/>
+          </a:ln>
+        </p:spPr>
+        <p:style>
+          <a:lnRef idx="1">
+            <a:schemeClr val="accent1"/>
+          </a:lnRef>
+          <a:fillRef idx="0">
+            <a:schemeClr val="accent1"/>
+          </a:fillRef>
+          <a:effectRef idx="0">
+            <a:schemeClr val="accent1"/>
+          </a:effectRef>
+          <a:fontRef idx="minor">
+            <a:schemeClr val="tx1"/>
+          </a:fontRef>
+        </p:style>
+      </p:cxnSp>
+      <p:cxnSp>
+        <p:nvCxnSpPr>
+          <p:cNvPr id="45" name="Straight Arrow Connector 44">
+            <a:extLst>
+              <a:ext uri="{FF2B5EF4-FFF2-40B4-BE49-F238E27FC236}">
+                <a16:creationId xmlns:a16="http://schemas.microsoft.com/office/drawing/2014/main" id="{F7DBB1C4-76DF-3C4D-949E-A33C72B37AE7}"/>
+              </a:ext>
+            </a:extLst>
+          </p:cNvPr>
+          <p:cNvCxnSpPr>
+            <a:cxnSpLocks/>
+            <a:stCxn id="4" idx="2"/>
+            <a:endCxn id="5" idx="0"/>
+          </p:cNvCxnSpPr>
+          <p:nvPr/>
+        </p:nvCxnSpPr>
+        <p:spPr>
+          <a:xfrm flipH="1">
+            <a:off x="770860" y="1990058"/>
+            <a:ext cx="1" cy="1022497"/>
+          </a:xfrm>
+          <a:prstGeom prst="straightConnector1">
+            <a:avLst/>
+          </a:prstGeom>
+          <a:ln w="19050">
+            <a:solidFill>
+              <a:schemeClr val="tx1">
+                <a:lumMod val="85000"/>
+                <a:lumOff val="15000"/>
+              </a:schemeClr>
+            </a:solidFill>
+            <a:tailEnd type="triangle"/>
+          </a:ln>
+        </p:spPr>
+        <p:style>
+          <a:lnRef idx="1">
+            <a:schemeClr val="accent1"/>
+          </a:lnRef>
+          <a:fillRef idx="0">
+            <a:schemeClr val="accent1"/>
+          </a:fillRef>
+          <a:effectRef idx="0">
+            <a:schemeClr val="accent1"/>
+          </a:effectRef>
+          <a:fontRef idx="minor">
+            <a:schemeClr val="tx1"/>
+          </a:fontRef>
+        </p:style>
+      </p:cxnSp>
+      <p:sp>
+        <p:nvSpPr>
+          <p:cNvPr id="48" name="Rectangle 47">
+            <a:extLst>
+              <a:ext uri="{FF2B5EF4-FFF2-40B4-BE49-F238E27FC236}">
+                <a16:creationId xmlns:a16="http://schemas.microsoft.com/office/drawing/2014/main" id="{A287E4A5-1EB4-8B41-8AAD-F2252060009A}"/>
+              </a:ext>
+            </a:extLst>
+          </p:cNvPr>
+          <p:cNvSpPr/>
+          <p:nvPr/>
+        </p:nvSpPr>
+        <p:spPr>
+          <a:xfrm>
+            <a:off x="2700670" y="1265274"/>
+            <a:ext cx="1031358" cy="342011"/>
+          </a:xfrm>
+          <a:prstGeom prst="rect">
+            <a:avLst/>
+          </a:prstGeom>
+          <a:solidFill>
+            <a:schemeClr val="tx1">
+              <a:lumMod val="50000"/>
+              <a:lumOff val="50000"/>
+            </a:schemeClr>
+          </a:solidFill>
+          <a:ln>
+            <a:noFill/>
+          </a:ln>
+        </p:spPr>
+        <p:style>
+          <a:lnRef idx="2">
+            <a:schemeClr val="accent1">
+              <a:shade val="50000"/>
+            </a:schemeClr>
+          </a:lnRef>
+          <a:fillRef idx="1">
+            <a:schemeClr val="accent1"/>
+          </a:fillRef>
+          <a:effectRef idx="0">
+            <a:schemeClr val="accent1"/>
+          </a:effectRef>
+          <a:fontRef idx="minor">
+            <a:schemeClr val="lt1"/>
+          </a:fontRef>
+        </p:style>
+        <p:txBody>
+          <a:bodyPr rtlCol="0" anchor="ctr"/>
+          <a:lstStyle/>
+          <a:p>
+            <a:pPr algn="ctr"/>
+            <a:r>
+              <a:rPr lang="en-US" sz="1600" dirty="0">
+                <a:latin typeface="Avenir Roman" panose="02000503020000020003" pitchFamily="2" charset="0"/>
+              </a:rPr>
+              <a:t>Catalog</a:t>
+            </a:r>
+          </a:p>
+        </p:txBody>
+      </p:sp>
+      <p:cxnSp>
+        <p:nvCxnSpPr>
+          <p:cNvPr id="50" name="Straight Arrow Connector 49">
+            <a:extLst>
+              <a:ext uri="{FF2B5EF4-FFF2-40B4-BE49-F238E27FC236}">
+                <a16:creationId xmlns:a16="http://schemas.microsoft.com/office/drawing/2014/main" id="{C7409FFB-1456-B64B-A218-0EFFAD622138}"/>
+              </a:ext>
+            </a:extLst>
+          </p:cNvPr>
+          <p:cNvCxnSpPr>
+            <a:stCxn id="48" idx="2"/>
+          </p:cNvCxnSpPr>
+          <p:nvPr/>
+        </p:nvCxnSpPr>
+        <p:spPr>
+          <a:xfrm>
+            <a:off x="3216349" y="1607285"/>
+            <a:ext cx="0" cy="765546"/>
+          </a:xfrm>
+          <a:prstGeom prst="straightConnector1">
+            <a:avLst/>
+          </a:prstGeom>
+          <a:ln w="19050">
+            <a:solidFill>
+              <a:schemeClr val="tx1">
+                <a:lumMod val="50000"/>
+                <a:lumOff val="50000"/>
+              </a:schemeClr>
+            </a:solidFill>
+            <a:prstDash val="dash"/>
+            <a:tailEnd type="triangle"/>
+          </a:ln>
+        </p:spPr>
+        <p:style>
+          <a:lnRef idx="1">
+            <a:schemeClr val="accent1"/>
+          </a:lnRef>
+          <a:fillRef idx="0">
+            <a:schemeClr val="accent1"/>
+          </a:fillRef>
+          <a:effectRef idx="0">
+            <a:schemeClr val="accent1"/>
+          </a:effectRef>
+          <a:fontRef idx="minor">
+            <a:schemeClr val="tx1"/>
+          </a:fontRef>
+        </p:style>
+      </p:cxnSp>
+    </p:spTree>
+    <p:extLst>
+      <p:ext uri="{BB962C8B-B14F-4D97-AF65-F5344CB8AC3E}">
+        <p14:creationId xmlns:p14="http://schemas.microsoft.com/office/powerpoint/2010/main" val="588617414"/>
+      </p:ext>
+    </p:extLst>
+  </p:cSld>
+  <p:clrMapOvr>
+    <a:masterClrMapping/>
+  </p:clrMapOvr>
+</p:sld>
+</file>
+
 <file path=ppt/theme/theme1.xml><?xml version="1.0" encoding="utf-8"?>
 <a:theme xmlns:a="http://schemas.openxmlformats.org/drawingml/2006/main" name="Office Theme">
   <a:themeElements>

</xml_diff>